<commit_message>
Creacion estructura base apartado tres, añadir base para ejercicios apartado dos y presentacion
</commit_message>
<xml_diff>
--- a/02_angular_cli/02_angular_cli.pptx
+++ b/02_angular_cli/02_angular_cli.pptx
@@ -7,7 +7,7 @@
     <p:sldMasterId id="2147483670" r:id="rId4"/>
   </p:sldMasterIdLst>
   <p:notesMasterIdLst>
-    <p:notesMasterId r:id="rId11"/>
+    <p:notesMasterId r:id="rId16"/>
   </p:notesMasterIdLst>
   <p:sldIdLst>
     <p:sldId id="314" r:id="rId5"/>
@@ -15,10 +15,22 @@
     <p:sldId id="515" r:id="rId7"/>
     <p:sldId id="484" r:id="rId8"/>
     <p:sldId id="496" r:id="rId9"/>
-    <p:sldId id="520" r:id="rId10"/>
-    <p:sldId id="521" r:id="rId12"/>
-    <p:sldId id="472" r:id="rId13"/>
-    <p:sldId id="464" r:id="rId14"/>
+    <p:sldId id="527" r:id="rId10"/>
+    <p:sldId id="533" r:id="rId11"/>
+    <p:sldId id="534" r:id="rId12"/>
+    <p:sldId id="535" r:id="rId13"/>
+    <p:sldId id="536" r:id="rId14"/>
+    <p:sldId id="520" r:id="rId15"/>
+    <p:sldId id="521" r:id="rId17"/>
+    <p:sldId id="524" r:id="rId18"/>
+    <p:sldId id="525" r:id="rId19"/>
+    <p:sldId id="528" r:id="rId20"/>
+    <p:sldId id="526" r:id="rId21"/>
+    <p:sldId id="529" r:id="rId22"/>
+    <p:sldId id="530" r:id="rId23"/>
+    <p:sldId id="532" r:id="rId24"/>
+    <p:sldId id="472" r:id="rId25"/>
+    <p:sldId id="464" r:id="rId26"/>
   </p:sldIdLst>
   <p:sldSz cx="12192000" cy="6858000"/>
   <p:notesSz cx="6858000" cy="9144000"/>
@@ -6881,6 +6893,1153 @@
 </p:sld>
 </file>
 
+<file path=ppt/slides/slide10.xml><?xml version="1.0" encoding="utf-8"?>
+<p:sld xmlns:a="http://schemas.openxmlformats.org/drawingml/2006/main" xmlns:r="http://schemas.openxmlformats.org/officeDocument/2006/relationships" xmlns:p="http://schemas.openxmlformats.org/presentationml/2006/main">
+  <p:cSld>
+    <p:spTree>
+      <p:nvGrpSpPr>
+        <p:cNvPr id="1" name=""/>
+        <p:cNvGrpSpPr/>
+        <p:nvPr/>
+      </p:nvGrpSpPr>
+      <p:grpSpPr/>
+      <p:sp>
+        <p:nvSpPr>
+          <p:cNvPr id="2" name="Título 1"/>
+          <p:cNvSpPr>
+            <a:spLocks noGrp="1"/>
+          </p:cNvSpPr>
+          <p:nvPr>
+            <p:ph type="title"/>
+          </p:nvPr>
+        </p:nvSpPr>
+        <p:spPr/>
+        <p:txBody>
+          <a:bodyPr/>
+          <a:p>
+            <a:endParaRPr lang="es-ES" altLang="en-US"/>
+          </a:p>
+        </p:txBody>
+      </p:sp>
+      <p:sp>
+        <p:nvSpPr>
+          <p:cNvPr id="3" name="Marcador de posición de texto 2"/>
+          <p:cNvSpPr>
+            <a:spLocks noGrp="1"/>
+          </p:cNvSpPr>
+          <p:nvPr>
+            <p:ph type="body" sz="quarter" idx="13"/>
+          </p:nvPr>
+        </p:nvSpPr>
+        <p:spPr/>
+        <p:txBody>
+          <a:bodyPr/>
+          <a:p>
+            <a:endParaRPr lang="es-ES" altLang="en-US"/>
+          </a:p>
+        </p:txBody>
+      </p:sp>
+      <p:sp>
+        <p:nvSpPr>
+          <p:cNvPr id="4" name="Cuadro de texto 3"/>
+          <p:cNvSpPr txBox="1"/>
+          <p:nvPr/>
+        </p:nvSpPr>
+        <p:spPr>
+          <a:xfrm>
+            <a:off x="2276475" y="2494280"/>
+            <a:ext cx="6844030" cy="460375"/>
+          </a:xfrm>
+          <a:prstGeom prst="rect">
+            <a:avLst/>
+          </a:prstGeom>
+          <a:noFill/>
+        </p:spPr>
+        <p:txBody>
+          <a:bodyPr wrap="square" rtlCol="0">
+            <a:spAutoFit/>
+          </a:bodyPr>
+          <a:p>
+            <a:r>
+              <a:rPr lang="es-ES" altLang="en-US"/>
+              <a:t>Ejercio comandos</a:t>
+            </a:r>
+            <a:endParaRPr lang="es-ES" altLang="en-US"/>
+          </a:p>
+        </p:txBody>
+      </p:sp>
+    </p:spTree>
+  </p:cSld>
+  <p:clrMapOvr>
+    <a:masterClrMapping/>
+  </p:clrMapOvr>
+</p:sld>
+</file>
+
+<file path=ppt/slides/slide11.xml><?xml version="1.0" encoding="utf-8"?>
+<p:sld xmlns:a="http://schemas.openxmlformats.org/drawingml/2006/main" xmlns:r="http://schemas.openxmlformats.org/officeDocument/2006/relationships" xmlns:p="http://schemas.openxmlformats.org/presentationml/2006/main">
+  <p:cSld>
+    <p:spTree>
+      <p:nvGrpSpPr>
+        <p:cNvPr id="1" name=""/>
+        <p:cNvGrpSpPr/>
+        <p:nvPr/>
+      </p:nvGrpSpPr>
+      <p:grpSpPr/>
+      <p:sp>
+        <p:nvSpPr>
+          <p:cNvPr id="2" name="Título 1"/>
+          <p:cNvSpPr>
+            <a:spLocks noGrp="1"/>
+          </p:cNvSpPr>
+          <p:nvPr>
+            <p:ph type="title"/>
+          </p:nvPr>
+        </p:nvSpPr>
+        <p:spPr/>
+        <p:txBody>
+          <a:bodyPr/>
+          <a:p>
+            <a:r>
+              <a:rPr lang="es-ES" altLang="en-US">
+                <a:sym typeface="+mn-ea"/>
+              </a:rPr>
+              <a:t>angular.json</a:t>
+            </a:r>
+            <a:endParaRPr lang="es-ES" altLang="en-US"/>
+          </a:p>
+        </p:txBody>
+      </p:sp>
+      <p:sp>
+        <p:nvSpPr>
+          <p:cNvPr id="3" name="Marcador de posición de texto 2"/>
+          <p:cNvSpPr>
+            <a:spLocks noGrp="1"/>
+          </p:cNvSpPr>
+          <p:nvPr>
+            <p:ph type="body" sz="quarter" idx="13"/>
+          </p:nvPr>
+        </p:nvSpPr>
+        <p:spPr/>
+        <p:txBody>
+          <a:bodyPr/>
+          <a:p>
+            <a:r>
+              <a:rPr lang="es-ES" altLang="en-US"/>
+              <a:t>What is</a:t>
+            </a:r>
+            <a:endParaRPr lang="es-ES" altLang="en-US"/>
+          </a:p>
+        </p:txBody>
+      </p:sp>
+      <p:pic>
+        <p:nvPicPr>
+          <p:cNvPr id="7" name="Imagen 6"/>
+          <p:cNvPicPr>
+            <a:picLocks noChangeAspect="1"/>
+          </p:cNvPicPr>
+          <p:nvPr/>
+        </p:nvPicPr>
+        <p:blipFill>
+          <a:blip r:embed="rId1"/>
+          <a:stretch>
+            <a:fillRect/>
+          </a:stretch>
+        </p:blipFill>
+        <p:spPr>
+          <a:xfrm>
+            <a:off x="432435" y="2510155"/>
+            <a:ext cx="4899660" cy="3910965"/>
+          </a:xfrm>
+          <a:prstGeom prst="rect">
+            <a:avLst/>
+          </a:prstGeom>
+        </p:spPr>
+      </p:pic>
+      <p:pic>
+        <p:nvPicPr>
+          <p:cNvPr id="8" name="Imagen 7"/>
+          <p:cNvPicPr>
+            <a:picLocks noChangeAspect="1"/>
+          </p:cNvPicPr>
+          <p:nvPr/>
+        </p:nvPicPr>
+        <p:blipFill>
+          <a:blip r:embed="rId2"/>
+          <a:stretch>
+            <a:fillRect/>
+          </a:stretch>
+        </p:blipFill>
+        <p:spPr>
+          <a:xfrm>
+            <a:off x="6322695" y="3451225"/>
+            <a:ext cx="5346065" cy="2969895"/>
+          </a:xfrm>
+          <a:prstGeom prst="rect">
+            <a:avLst/>
+          </a:prstGeom>
+        </p:spPr>
+      </p:pic>
+      <p:sp>
+        <p:nvSpPr>
+          <p:cNvPr id="9" name="Cuadro de texto 8"/>
+          <p:cNvSpPr txBox="1"/>
+          <p:nvPr/>
+        </p:nvSpPr>
+        <p:spPr>
+          <a:xfrm>
+            <a:off x="299085" y="1424940"/>
+            <a:ext cx="6139815" cy="1198880"/>
+          </a:xfrm>
+          <a:prstGeom prst="rect">
+            <a:avLst/>
+          </a:prstGeom>
+          <a:noFill/>
+        </p:spPr>
+        <p:txBody>
+          <a:bodyPr wrap="square" rtlCol="0" anchor="t">
+            <a:spAutoFit/>
+          </a:bodyPr>
+          <a:p>
+            <a:r>
+              <a:rPr lang="es-ES" altLang="en-US"/>
+              <a:t>This file is used as the configuration schema for the whole project and manipulated by the CLI. </a:t>
+            </a:r>
+            <a:endParaRPr lang="es-ES" altLang="en-US"/>
+          </a:p>
+          <a:p>
+            <a:endParaRPr lang="es-ES" altLang="en-US"/>
+          </a:p>
+        </p:txBody>
+      </p:sp>
+      <p:sp>
+        <p:nvSpPr>
+          <p:cNvPr id="10" name="Cuadro de texto 9"/>
+          <p:cNvSpPr txBox="1"/>
+          <p:nvPr/>
+        </p:nvSpPr>
+        <p:spPr>
+          <a:xfrm>
+            <a:off x="6477000" y="1441450"/>
+            <a:ext cx="5095240" cy="1938020"/>
+          </a:xfrm>
+          <a:prstGeom prst="rect">
+            <a:avLst/>
+          </a:prstGeom>
+          <a:noFill/>
+        </p:spPr>
+        <p:txBody>
+          <a:bodyPr wrap="square" rtlCol="0" anchor="t">
+            <a:spAutoFit/>
+          </a:bodyPr>
+          <a:p>
+            <a:pPr algn="r"/>
+            <a:r>
+              <a:rPr lang="es-ES" altLang="en-US">
+                <a:sym typeface="+mn-ea"/>
+              </a:rPr>
+              <a:t>Including managing of different environments, testing, proxy, third-party resources and plenty of built-in tools and capabilities for developing our application.</a:t>
+            </a:r>
+            <a:endParaRPr lang="es-ES" altLang="en-US"/>
+          </a:p>
+        </p:txBody>
+      </p:sp>
+    </p:spTree>
+  </p:cSld>
+  <p:clrMapOvr>
+    <a:masterClrMapping/>
+  </p:clrMapOvr>
+</p:sld>
+</file>
+
+<file path=ppt/slides/slide12.xml><?xml version="1.0" encoding="utf-8"?>
+<p:sld xmlns:a="http://schemas.openxmlformats.org/drawingml/2006/main" xmlns:r="http://schemas.openxmlformats.org/officeDocument/2006/relationships" xmlns:p="http://schemas.openxmlformats.org/presentationml/2006/main">
+  <p:cSld>
+    <p:spTree>
+      <p:nvGrpSpPr>
+        <p:cNvPr id="1" name=""/>
+        <p:cNvGrpSpPr/>
+        <p:nvPr/>
+      </p:nvGrpSpPr>
+      <p:grpSpPr/>
+      <p:sp>
+        <p:nvSpPr>
+          <p:cNvPr id="2" name="Título 1"/>
+          <p:cNvSpPr>
+            <a:spLocks noGrp="1"/>
+          </p:cNvSpPr>
+          <p:nvPr>
+            <p:ph type="title"/>
+          </p:nvPr>
+        </p:nvSpPr>
+        <p:spPr/>
+        <p:txBody>
+          <a:bodyPr/>
+          <a:p>
+            <a:r>
+              <a:rPr lang="es-ES" altLang="en-US">
+                <a:sym typeface="+mn-ea"/>
+              </a:rPr>
+              <a:t>angular.json</a:t>
+            </a:r>
+            <a:br>
+              <a:rPr lang="es-ES" altLang="en-US"/>
+            </a:br>
+            <a:br>
+              <a:rPr lang="es-ES" altLang="en-US"/>
+            </a:br>
+            <a:endParaRPr lang="es-ES" altLang="en-US"/>
+          </a:p>
+        </p:txBody>
+      </p:sp>
+      <p:sp>
+        <p:nvSpPr>
+          <p:cNvPr id="3" name="Marcador de posición de texto 2"/>
+          <p:cNvSpPr>
+            <a:spLocks noGrp="1"/>
+          </p:cNvSpPr>
+          <p:nvPr>
+            <p:ph type="body" sz="quarter" idx="13"/>
+          </p:nvPr>
+        </p:nvSpPr>
+        <p:spPr>
+          <a:xfrm>
+            <a:off x="299400" y="744522"/>
+            <a:ext cx="6228401" cy="513014"/>
+          </a:xfrm>
+        </p:spPr>
+        <p:txBody>
+          <a:bodyPr/>
+          <a:p>
+            <a:r>
+              <a:rPr lang="es-ES" altLang="en-US">
+                <a:sym typeface="+mn-ea"/>
+              </a:rPr>
+              <a:t>migration</a:t>
+            </a:r>
+            <a:endParaRPr lang="es-ES" altLang="en-US"/>
+          </a:p>
+        </p:txBody>
+      </p:sp>
+      <p:pic>
+        <p:nvPicPr>
+          <p:cNvPr id="4" name="Imagen 3" descr="angular-cli-workspace-example"/>
+          <p:cNvPicPr>
+            <a:picLocks noChangeAspect="1"/>
+          </p:cNvPicPr>
+          <p:nvPr/>
+        </p:nvPicPr>
+        <p:blipFill>
+          <a:blip r:embed="rId1"/>
+          <a:stretch>
+            <a:fillRect/>
+          </a:stretch>
+        </p:blipFill>
+        <p:spPr>
+          <a:xfrm>
+            <a:off x="3780155" y="3180715"/>
+            <a:ext cx="5253355" cy="1118870"/>
+          </a:xfrm>
+          <a:prstGeom prst="rect">
+            <a:avLst/>
+          </a:prstGeom>
+        </p:spPr>
+      </p:pic>
+      <p:sp>
+        <p:nvSpPr>
+          <p:cNvPr id="5" name="Cuadro de texto 4"/>
+          <p:cNvSpPr txBox="1"/>
+          <p:nvPr/>
+        </p:nvSpPr>
+        <p:spPr>
+          <a:xfrm>
+            <a:off x="299400" y="1717040"/>
+            <a:ext cx="2964815" cy="829945"/>
+          </a:xfrm>
+          <a:prstGeom prst="rect">
+            <a:avLst/>
+          </a:prstGeom>
+          <a:noFill/>
+        </p:spPr>
+        <p:txBody>
+          <a:bodyPr wrap="square" rtlCol="0">
+            <a:spAutoFit/>
+          </a:bodyPr>
+          <a:p>
+            <a:r>
+              <a:rPr lang="es-ES" altLang="en-US"/>
+              <a:t>Migracion</a:t>
+            </a:r>
+            <a:endParaRPr lang="es-ES" altLang="en-US"/>
+          </a:p>
+          <a:p>
+            <a:endParaRPr lang="es-ES" altLang="en-US"/>
+          </a:p>
+        </p:txBody>
+      </p:sp>
+    </p:spTree>
+  </p:cSld>
+  <p:clrMapOvr>
+    <a:masterClrMapping/>
+  </p:clrMapOvr>
+</p:sld>
+</file>
+
+<file path=ppt/slides/slide13.xml><?xml version="1.0" encoding="utf-8"?>
+<p:sld xmlns:a="http://schemas.openxmlformats.org/drawingml/2006/main" xmlns:r="http://schemas.openxmlformats.org/officeDocument/2006/relationships" xmlns:p="http://schemas.openxmlformats.org/presentationml/2006/main">
+  <p:cSld>
+    <p:spTree>
+      <p:nvGrpSpPr>
+        <p:cNvPr id="1" name=""/>
+        <p:cNvGrpSpPr/>
+        <p:nvPr/>
+      </p:nvGrpSpPr>
+      <p:grpSpPr/>
+      <p:sp>
+        <p:nvSpPr>
+          <p:cNvPr id="2" name="Título 1"/>
+          <p:cNvSpPr>
+            <a:spLocks noGrp="1"/>
+          </p:cNvSpPr>
+          <p:nvPr>
+            <p:ph type="title"/>
+          </p:nvPr>
+        </p:nvSpPr>
+        <p:spPr/>
+        <p:txBody>
+          <a:bodyPr/>
+          <a:p>
+            <a:r>
+              <a:rPr lang="es-ES" altLang="en-US">
+                <a:sym typeface="+mn-ea"/>
+              </a:rPr>
+              <a:t>angular.json</a:t>
+            </a:r>
+            <a:endParaRPr lang="es-ES" altLang="en-US"/>
+          </a:p>
+        </p:txBody>
+      </p:sp>
+      <p:sp>
+        <p:nvSpPr>
+          <p:cNvPr id="3" name="Marcador de posición de texto 2"/>
+          <p:cNvSpPr>
+            <a:spLocks noGrp="1"/>
+          </p:cNvSpPr>
+          <p:nvPr>
+            <p:ph type="body" sz="quarter" idx="13"/>
+          </p:nvPr>
+        </p:nvSpPr>
+        <p:spPr/>
+        <p:txBody>
+          <a:bodyPr/>
+          <a:p>
+            <a:r>
+              <a:rPr lang="es-ES" altLang="en-US">
+                <a:sym typeface="+mn-ea"/>
+              </a:rPr>
+              <a:t>Configurations</a:t>
+            </a:r>
+            <a:endParaRPr lang="es-ES" altLang="en-US"/>
+          </a:p>
+        </p:txBody>
+      </p:sp>
+      <p:sp>
+        <p:nvSpPr>
+          <p:cNvPr id="7" name="Cuadro de texto 6"/>
+          <p:cNvSpPr txBox="1"/>
+          <p:nvPr/>
+        </p:nvSpPr>
+        <p:spPr>
+          <a:xfrm>
+            <a:off x="4157345" y="3034030"/>
+            <a:ext cx="2566670" cy="3415030"/>
+          </a:xfrm>
+          <a:prstGeom prst="rect">
+            <a:avLst/>
+          </a:prstGeom>
+          <a:noFill/>
+        </p:spPr>
+        <p:txBody>
+          <a:bodyPr wrap="square" rtlCol="0">
+            <a:spAutoFit/>
+          </a:bodyPr>
+          <a:p>
+            <a:pPr marL="342900" indent="-342900">
+              <a:buFont typeface="Arial" panose="020B0604020202020204" pitchFamily="34" charset="0"/>
+              <a:buChar char="•"/>
+            </a:pPr>
+            <a:r>
+              <a:rPr lang="es-ES" altLang="en-US"/>
+              <a:t>build</a:t>
+            </a:r>
+            <a:endParaRPr lang="es-ES" altLang="en-US"/>
+          </a:p>
+          <a:p>
+            <a:pPr marL="342900" indent="-342900">
+              <a:buFont typeface="Arial" panose="020B0604020202020204" pitchFamily="34" charset="0"/>
+              <a:buChar char="•"/>
+            </a:pPr>
+            <a:r>
+              <a:rPr lang="es-ES" altLang="en-US"/>
+              <a:t>serve</a:t>
+            </a:r>
+            <a:endParaRPr lang="es-ES" altLang="en-US"/>
+          </a:p>
+          <a:p>
+            <a:pPr marL="342900" indent="-342900">
+              <a:buFont typeface="Arial" panose="020B0604020202020204" pitchFamily="34" charset="0"/>
+              <a:buChar char="•"/>
+            </a:pPr>
+            <a:r>
+              <a:rPr lang="es-ES" altLang="en-US"/>
+              <a:t>extract-i18n</a:t>
+            </a:r>
+            <a:endParaRPr lang="es-ES" altLang="en-US"/>
+          </a:p>
+          <a:p>
+            <a:pPr marL="342900" indent="-342900">
+              <a:buFont typeface="Arial" panose="020B0604020202020204" pitchFamily="34" charset="0"/>
+              <a:buChar char="•"/>
+            </a:pPr>
+            <a:r>
+              <a:rPr lang="es-ES" altLang="en-US"/>
+              <a:t>test</a:t>
+            </a:r>
+            <a:endParaRPr lang="es-ES" altLang="en-US"/>
+          </a:p>
+          <a:p>
+            <a:pPr marL="342900" indent="-342900">
+              <a:buFont typeface="Arial" panose="020B0604020202020204" pitchFamily="34" charset="0"/>
+              <a:buChar char="•"/>
+            </a:pPr>
+            <a:r>
+              <a:rPr lang="es-ES" altLang="en-US"/>
+              <a:t>lint</a:t>
+            </a:r>
+            <a:endParaRPr lang="es-ES" altLang="en-US"/>
+          </a:p>
+          <a:p>
+            <a:pPr marL="342900" indent="-342900">
+              <a:buFont typeface="Arial" panose="020B0604020202020204" pitchFamily="34" charset="0"/>
+              <a:buChar char="•"/>
+            </a:pPr>
+            <a:r>
+              <a:rPr lang="es-ES" altLang="en-US"/>
+              <a:t>karma</a:t>
+            </a:r>
+            <a:endParaRPr lang="es-ES" altLang="en-US"/>
+          </a:p>
+          <a:p>
+            <a:pPr marL="342900" indent="-342900">
+              <a:buFont typeface="Arial" panose="020B0604020202020204" pitchFamily="34" charset="0"/>
+              <a:buChar char="•"/>
+            </a:pPr>
+            <a:r>
+              <a:rPr lang="es-ES" altLang="en-US"/>
+              <a:t>app-shell</a:t>
+            </a:r>
+            <a:endParaRPr lang="es-ES" altLang="en-US"/>
+          </a:p>
+          <a:p>
+            <a:pPr marL="342900" indent="-342900">
+              <a:buFont typeface="Arial" panose="020B0604020202020204" pitchFamily="34" charset="0"/>
+              <a:buChar char="•"/>
+            </a:pPr>
+            <a:r>
+              <a:rPr lang="es-ES" altLang="en-US"/>
+              <a:t>...</a:t>
+            </a:r>
+            <a:endParaRPr lang="es-ES" altLang="en-US"/>
+          </a:p>
+          <a:p>
+            <a:pPr marL="342900" indent="-342900">
+              <a:buFont typeface="Arial" panose="020B0604020202020204" pitchFamily="34" charset="0"/>
+              <a:buChar char="•"/>
+            </a:pPr>
+            <a:endParaRPr lang="es-ES" altLang="en-US"/>
+          </a:p>
+        </p:txBody>
+      </p:sp>
+      <p:pic>
+        <p:nvPicPr>
+          <p:cNvPr id="9" name="Imagen 8"/>
+          <p:cNvPicPr>
+            <a:picLocks noChangeAspect="1"/>
+          </p:cNvPicPr>
+          <p:nvPr/>
+        </p:nvPicPr>
+        <p:blipFill>
+          <a:blip r:embed="rId1"/>
+          <a:stretch>
+            <a:fillRect/>
+          </a:stretch>
+        </p:blipFill>
+        <p:spPr>
+          <a:xfrm>
+            <a:off x="7136130" y="1113790"/>
+            <a:ext cx="5091430" cy="5838825"/>
+          </a:xfrm>
+          <a:prstGeom prst="rect">
+            <a:avLst/>
+          </a:prstGeom>
+        </p:spPr>
+      </p:pic>
+      <p:sp>
+        <p:nvSpPr>
+          <p:cNvPr id="10" name="Cuadro de texto 9"/>
+          <p:cNvSpPr txBox="1"/>
+          <p:nvPr/>
+        </p:nvSpPr>
+        <p:spPr>
+          <a:xfrm>
+            <a:off x="299085" y="1619885"/>
+            <a:ext cx="6228715" cy="829945"/>
+          </a:xfrm>
+          <a:prstGeom prst="rect">
+            <a:avLst/>
+          </a:prstGeom>
+          <a:noFill/>
+        </p:spPr>
+        <p:txBody>
+          <a:bodyPr wrap="square" rtlCol="0" anchor="t">
+            <a:spAutoFit/>
+          </a:bodyPr>
+          <a:p>
+            <a:r>
+              <a:rPr lang="es-ES" altLang="en-US"/>
+              <a:t>Any project in a workspace able to contain and customize automatic task commands.</a:t>
+            </a:r>
+            <a:endParaRPr lang="es-ES" altLang="en-US"/>
+          </a:p>
+        </p:txBody>
+      </p:sp>
+    </p:spTree>
+  </p:cSld>
+  <p:clrMapOvr>
+    <a:masterClrMapping/>
+  </p:clrMapOvr>
+</p:sld>
+</file>
+
+<file path=ppt/slides/slide14.xml><?xml version="1.0" encoding="utf-8"?>
+<p:sld xmlns:a="http://schemas.openxmlformats.org/drawingml/2006/main" xmlns:r="http://schemas.openxmlformats.org/officeDocument/2006/relationships" xmlns:p="http://schemas.openxmlformats.org/presentationml/2006/main">
+  <p:cSld>
+    <p:spTree>
+      <p:nvGrpSpPr>
+        <p:cNvPr id="1" name=""/>
+        <p:cNvGrpSpPr/>
+        <p:nvPr/>
+      </p:nvGrpSpPr>
+      <p:grpSpPr/>
+      <p:sp>
+        <p:nvSpPr>
+          <p:cNvPr id="2" name="Título 1"/>
+          <p:cNvSpPr>
+            <a:spLocks noGrp="1"/>
+          </p:cNvSpPr>
+          <p:nvPr>
+            <p:ph type="title"/>
+          </p:nvPr>
+        </p:nvSpPr>
+        <p:spPr/>
+        <p:txBody>
+          <a:bodyPr/>
+          <a:p>
+            <a:r>
+              <a:rPr lang="es-ES" altLang="en-US">
+                <a:sym typeface="+mn-ea"/>
+              </a:rPr>
+              <a:t>Angular CLI</a:t>
+            </a:r>
+            <a:br>
+              <a:rPr lang="es-ES" altLang="en-US"/>
+            </a:br>
+            <a:endParaRPr lang="es-ES" altLang="en-US"/>
+          </a:p>
+        </p:txBody>
+      </p:sp>
+      <p:sp>
+        <p:nvSpPr>
+          <p:cNvPr id="3" name="Marcador de posición de texto 2"/>
+          <p:cNvSpPr>
+            <a:spLocks noGrp="1"/>
+          </p:cNvSpPr>
+          <p:nvPr>
+            <p:ph type="body" sz="quarter" idx="13"/>
+          </p:nvPr>
+        </p:nvSpPr>
+        <p:spPr/>
+        <p:txBody>
+          <a:bodyPr/>
+          <a:p>
+            <a:r>
+              <a:rPr lang="es-ES" altLang="en-US">
+                <a:sym typeface="+mn-ea"/>
+              </a:rPr>
+              <a:t>angular.json</a:t>
+            </a:r>
+            <a:endParaRPr lang="es-ES" altLang="en-US"/>
+          </a:p>
+        </p:txBody>
+      </p:sp>
+      <p:sp>
+        <p:nvSpPr>
+          <p:cNvPr id="6" name="Cuadro de texto 5"/>
+          <p:cNvSpPr txBox="1"/>
+          <p:nvPr/>
+        </p:nvSpPr>
+        <p:spPr>
+          <a:xfrm>
+            <a:off x="299085" y="1818005"/>
+            <a:ext cx="6003290" cy="460375"/>
+          </a:xfrm>
+          <a:prstGeom prst="rect">
+            <a:avLst/>
+          </a:prstGeom>
+          <a:noFill/>
+        </p:spPr>
+        <p:txBody>
+          <a:bodyPr wrap="square" rtlCol="0">
+            <a:spAutoFit/>
+          </a:bodyPr>
+          <a:p>
+            <a:r>
+              <a:rPr lang="es-ES" altLang="en-US"/>
+              <a:t>Multiples proyectos??</a:t>
+            </a:r>
+            <a:endParaRPr lang="es-ES" altLang="en-US"/>
+          </a:p>
+        </p:txBody>
+      </p:sp>
+    </p:spTree>
+  </p:cSld>
+  <p:clrMapOvr>
+    <a:masterClrMapping/>
+  </p:clrMapOvr>
+</p:sld>
+</file>
+
+<file path=ppt/slides/slide15.xml><?xml version="1.0" encoding="utf-8"?>
+<p:sld xmlns:a="http://schemas.openxmlformats.org/drawingml/2006/main" xmlns:r="http://schemas.openxmlformats.org/officeDocument/2006/relationships" xmlns:p="http://schemas.openxmlformats.org/presentationml/2006/main">
+  <p:cSld>
+    <p:spTree>
+      <p:nvGrpSpPr>
+        <p:cNvPr id="1" name=""/>
+        <p:cNvGrpSpPr/>
+        <p:nvPr/>
+      </p:nvGrpSpPr>
+      <p:grpSpPr/>
+      <p:sp>
+        <p:nvSpPr>
+          <p:cNvPr id="2" name="Título 1"/>
+          <p:cNvSpPr>
+            <a:spLocks noGrp="1"/>
+          </p:cNvSpPr>
+          <p:nvPr>
+            <p:ph type="title"/>
+          </p:nvPr>
+        </p:nvSpPr>
+        <p:spPr/>
+        <p:txBody>
+          <a:bodyPr/>
+          <a:p>
+            <a:r>
+              <a:rPr lang="es-ES" altLang="en-US">
+                <a:sym typeface="+mn-ea"/>
+              </a:rPr>
+              <a:t>Commands</a:t>
+            </a:r>
+            <a:br>
+              <a:rPr lang="es-ES" altLang="en-US"/>
+            </a:br>
+            <a:endParaRPr lang="es-ES" altLang="en-US"/>
+          </a:p>
+        </p:txBody>
+      </p:sp>
+      <p:sp>
+        <p:nvSpPr>
+          <p:cNvPr id="3" name="Marcador de posición de texto 2"/>
+          <p:cNvSpPr>
+            <a:spLocks noGrp="1"/>
+          </p:cNvSpPr>
+          <p:nvPr>
+            <p:ph type="body" sz="quarter" idx="13"/>
+          </p:nvPr>
+        </p:nvSpPr>
+        <p:spPr/>
+        <p:txBody>
+          <a:bodyPr/>
+          <a:p>
+            <a:r>
+              <a:rPr lang="es-ES" altLang="en-US"/>
+              <a:t>ng build</a:t>
+            </a:r>
+            <a:endParaRPr lang="es-ES" altLang="en-US"/>
+          </a:p>
+        </p:txBody>
+      </p:sp>
+      <p:sp>
+        <p:nvSpPr>
+          <p:cNvPr id="4" name="Cuadro de texto 3"/>
+          <p:cNvSpPr txBox="1"/>
+          <p:nvPr/>
+        </p:nvSpPr>
+        <p:spPr>
+          <a:xfrm>
+            <a:off x="435610" y="1612265"/>
+            <a:ext cx="7240270" cy="1198880"/>
+          </a:xfrm>
+          <a:prstGeom prst="rect">
+            <a:avLst/>
+          </a:prstGeom>
+          <a:noFill/>
+        </p:spPr>
+        <p:txBody>
+          <a:bodyPr wrap="square" rtlCol="0" anchor="t">
+            <a:spAutoFit/>
+          </a:bodyPr>
+          <a:p>
+            <a:r>
+              <a:rPr lang="es-ES" altLang="en-US"/>
+              <a:t>Compiles an Angular app into an output directory named dist/ at the given output path. Must be executed from within a workspace directory.</a:t>
+            </a:r>
+            <a:endParaRPr lang="es-ES" altLang="en-US"/>
+          </a:p>
+        </p:txBody>
+      </p:sp>
+      <p:sp>
+        <p:nvSpPr>
+          <p:cNvPr id="5" name="Cuadro de texto 4"/>
+          <p:cNvSpPr txBox="1"/>
+          <p:nvPr/>
+        </p:nvSpPr>
+        <p:spPr>
+          <a:xfrm>
+            <a:off x="435610" y="3143885"/>
+            <a:ext cx="7239635" cy="829945"/>
+          </a:xfrm>
+          <a:prstGeom prst="rect">
+            <a:avLst/>
+          </a:prstGeom>
+          <a:noFill/>
+        </p:spPr>
+        <p:txBody>
+          <a:bodyPr wrap="square" rtlCol="0" anchor="t">
+            <a:spAutoFit/>
+          </a:bodyPr>
+          <a:p>
+            <a:r>
+              <a:rPr lang="es-ES" altLang="en-US"/>
+              <a:t>Uses the Webpack build tool, with environment and build options specified in the CLI configuration file.</a:t>
+            </a:r>
+            <a:endParaRPr lang="es-ES" altLang="en-US"/>
+          </a:p>
+        </p:txBody>
+      </p:sp>
+    </p:spTree>
+  </p:cSld>
+  <p:clrMapOvr>
+    <a:masterClrMapping/>
+  </p:clrMapOvr>
+</p:sld>
+</file>
+
+<file path=ppt/slides/slide16.xml><?xml version="1.0" encoding="utf-8"?>
+<p:sld xmlns:a="http://schemas.openxmlformats.org/drawingml/2006/main" xmlns:r="http://schemas.openxmlformats.org/officeDocument/2006/relationships" xmlns:p="http://schemas.openxmlformats.org/presentationml/2006/main">
+  <p:cSld>
+    <p:spTree>
+      <p:nvGrpSpPr>
+        <p:cNvPr id="1" name=""/>
+        <p:cNvGrpSpPr/>
+        <p:nvPr/>
+      </p:nvGrpSpPr>
+      <p:grpSpPr/>
+      <p:sp>
+        <p:nvSpPr>
+          <p:cNvPr id="2" name="Título 1"/>
+          <p:cNvSpPr>
+            <a:spLocks noGrp="1"/>
+          </p:cNvSpPr>
+          <p:nvPr>
+            <p:ph type="title"/>
+          </p:nvPr>
+        </p:nvSpPr>
+        <p:spPr/>
+        <p:txBody>
+          <a:bodyPr/>
+          <a:p>
+            <a:r>
+              <a:rPr lang="es-ES" altLang="en-US">
+                <a:sym typeface="+mn-ea"/>
+              </a:rPr>
+              <a:t>Angular CLI</a:t>
+            </a:r>
+            <a:endParaRPr lang="es-ES" altLang="en-US"/>
+          </a:p>
+        </p:txBody>
+      </p:sp>
+      <p:sp>
+        <p:nvSpPr>
+          <p:cNvPr id="3" name="Marcador de posición de texto 2"/>
+          <p:cNvSpPr>
+            <a:spLocks noGrp="1"/>
+          </p:cNvSpPr>
+          <p:nvPr>
+            <p:ph type="body" sz="quarter" idx="13"/>
+          </p:nvPr>
+        </p:nvSpPr>
+        <p:spPr/>
+        <p:txBody>
+          <a:bodyPr/>
+          <a:p>
+            <a:endParaRPr lang="es-ES" altLang="en-US"/>
+          </a:p>
+        </p:txBody>
+      </p:sp>
+      <p:sp>
+        <p:nvSpPr>
+          <p:cNvPr id="4" name="Cuadro de texto 3"/>
+          <p:cNvSpPr txBox="1"/>
+          <p:nvPr/>
+        </p:nvSpPr>
+        <p:spPr>
+          <a:xfrm>
+            <a:off x="299085" y="2044700"/>
+            <a:ext cx="8434705" cy="460375"/>
+          </a:xfrm>
+          <a:prstGeom prst="rect">
+            <a:avLst/>
+          </a:prstGeom>
+          <a:noFill/>
+        </p:spPr>
+        <p:txBody>
+          <a:bodyPr wrap="square" rtlCol="0">
+            <a:spAutoFit/>
+          </a:bodyPr>
+          <a:p>
+            <a:r>
+              <a:rPr lang="es-ES" altLang="en-US"/>
+              <a:t>Ejercicio Enviroments</a:t>
+            </a:r>
+            <a:endParaRPr lang="es-ES" altLang="en-US"/>
+          </a:p>
+        </p:txBody>
+      </p:sp>
+    </p:spTree>
+  </p:cSld>
+  <p:clrMapOvr>
+    <a:masterClrMapping/>
+  </p:clrMapOvr>
+</p:sld>
+</file>
+
+<file path=ppt/slides/slide17.xml><?xml version="1.0" encoding="utf-8"?>
+<p:sld xmlns:a="http://schemas.openxmlformats.org/drawingml/2006/main" xmlns:r="http://schemas.openxmlformats.org/officeDocument/2006/relationships" xmlns:p="http://schemas.openxmlformats.org/presentationml/2006/main">
+  <p:cSld>
+    <p:spTree>
+      <p:nvGrpSpPr>
+        <p:cNvPr id="1" name=""/>
+        <p:cNvGrpSpPr/>
+        <p:nvPr/>
+      </p:nvGrpSpPr>
+      <p:grpSpPr/>
+      <p:sp>
+        <p:nvSpPr>
+          <p:cNvPr id="2" name="Título 1"/>
+          <p:cNvSpPr>
+            <a:spLocks noGrp="1"/>
+          </p:cNvSpPr>
+          <p:nvPr>
+            <p:ph type="title"/>
+          </p:nvPr>
+        </p:nvSpPr>
+        <p:spPr/>
+        <p:txBody>
+          <a:bodyPr/>
+          <a:p>
+            <a:r>
+              <a:rPr lang="es-ES" altLang="en-US"/>
+              <a:t>Npm</a:t>
+            </a:r>
+            <a:endParaRPr lang="es-ES" altLang="en-US"/>
+          </a:p>
+        </p:txBody>
+      </p:sp>
+      <p:sp>
+        <p:nvSpPr>
+          <p:cNvPr id="3" name="Marcador de posición de texto 2"/>
+          <p:cNvSpPr>
+            <a:spLocks noGrp="1"/>
+          </p:cNvSpPr>
+          <p:nvPr>
+            <p:ph type="body" sz="quarter" idx="13"/>
+          </p:nvPr>
+        </p:nvSpPr>
+        <p:spPr/>
+        <p:txBody>
+          <a:bodyPr/>
+          <a:p>
+            <a:r>
+              <a:rPr lang="es-ES" altLang="en-US"/>
+              <a:t>What is</a:t>
+            </a:r>
+            <a:endParaRPr lang="es-ES" altLang="en-US"/>
+          </a:p>
+        </p:txBody>
+      </p:sp>
+    </p:spTree>
+  </p:cSld>
+  <p:clrMapOvr>
+    <a:masterClrMapping/>
+  </p:clrMapOvr>
+</p:sld>
+</file>
+
+<file path=ppt/slides/slide18.xml><?xml version="1.0" encoding="utf-8"?>
+<p:sld xmlns:a="http://schemas.openxmlformats.org/drawingml/2006/main" xmlns:r="http://schemas.openxmlformats.org/officeDocument/2006/relationships" xmlns:p="http://schemas.openxmlformats.org/presentationml/2006/main">
+  <p:cSld>
+    <p:spTree>
+      <p:nvGrpSpPr>
+        <p:cNvPr id="1" name=""/>
+        <p:cNvGrpSpPr/>
+        <p:nvPr/>
+      </p:nvGrpSpPr>
+      <p:grpSpPr/>
+      <p:sp>
+        <p:nvSpPr>
+          <p:cNvPr id="2" name="Título 1"/>
+          <p:cNvSpPr>
+            <a:spLocks noGrp="1"/>
+          </p:cNvSpPr>
+          <p:nvPr>
+            <p:ph type="title"/>
+          </p:nvPr>
+        </p:nvSpPr>
+        <p:spPr/>
+        <p:txBody>
+          <a:bodyPr/>
+          <a:p>
+            <a:r>
+              <a:rPr lang="es-ES" altLang="en-US"/>
+              <a:t>Npm</a:t>
+            </a:r>
+            <a:endParaRPr lang="es-ES" altLang="en-US"/>
+          </a:p>
+        </p:txBody>
+      </p:sp>
+      <p:sp>
+        <p:nvSpPr>
+          <p:cNvPr id="3" name="Marcador de posición de texto 2"/>
+          <p:cNvSpPr>
+            <a:spLocks noGrp="1"/>
+          </p:cNvSpPr>
+          <p:nvPr>
+            <p:ph type="body" sz="quarter" idx="13"/>
+          </p:nvPr>
+        </p:nvSpPr>
+        <p:spPr/>
+        <p:txBody>
+          <a:bodyPr/>
+          <a:p>
+            <a:r>
+              <a:rPr lang="es-ES" altLang="en-US"/>
+              <a:t>Task-Runner</a:t>
+            </a:r>
+            <a:endParaRPr lang="es-ES" altLang="en-US"/>
+          </a:p>
+        </p:txBody>
+      </p:sp>
+    </p:spTree>
+  </p:cSld>
+  <p:clrMapOvr>
+    <a:masterClrMapping/>
+  </p:clrMapOvr>
+</p:sld>
+</file>
+
+<file path=ppt/slides/slide19.xml><?xml version="1.0" encoding="utf-8"?>
+<p:sld xmlns:a="http://schemas.openxmlformats.org/drawingml/2006/main" xmlns:r="http://schemas.openxmlformats.org/officeDocument/2006/relationships" xmlns:p="http://schemas.openxmlformats.org/presentationml/2006/main">
+  <p:cSld>
+    <p:spTree>
+      <p:nvGrpSpPr>
+        <p:cNvPr id="1" name=""/>
+        <p:cNvGrpSpPr/>
+        <p:nvPr/>
+      </p:nvGrpSpPr>
+      <p:grpSpPr/>
+      <p:sp>
+        <p:nvSpPr>
+          <p:cNvPr id="2" name="Título 1"/>
+          <p:cNvSpPr>
+            <a:spLocks noGrp="1"/>
+          </p:cNvSpPr>
+          <p:nvPr>
+            <p:ph type="title"/>
+          </p:nvPr>
+        </p:nvSpPr>
+        <p:spPr/>
+        <p:txBody>
+          <a:bodyPr/>
+          <a:p>
+            <a:endParaRPr lang="es-ES" altLang="en-US"/>
+          </a:p>
+        </p:txBody>
+      </p:sp>
+      <p:sp>
+        <p:nvSpPr>
+          <p:cNvPr id="3" name="Marcador de posición de texto 2"/>
+          <p:cNvSpPr>
+            <a:spLocks noGrp="1"/>
+          </p:cNvSpPr>
+          <p:nvPr>
+            <p:ph type="body" sz="quarter" idx="13"/>
+          </p:nvPr>
+        </p:nvSpPr>
+        <p:spPr/>
+        <p:txBody>
+          <a:bodyPr/>
+          <a:p>
+            <a:endParaRPr lang="es-ES" altLang="en-US"/>
+          </a:p>
+        </p:txBody>
+      </p:sp>
+      <p:sp>
+        <p:nvSpPr>
+          <p:cNvPr id="4" name="Cuadro de texto 3"/>
+          <p:cNvSpPr txBox="1"/>
+          <p:nvPr/>
+        </p:nvSpPr>
+        <p:spPr>
+          <a:xfrm>
+            <a:off x="1351915" y="1779270"/>
+            <a:ext cx="8200390" cy="460375"/>
+          </a:xfrm>
+          <a:prstGeom prst="rect">
+            <a:avLst/>
+          </a:prstGeom>
+          <a:noFill/>
+        </p:spPr>
+        <p:txBody>
+          <a:bodyPr wrap="square" rtlCol="0">
+            <a:spAutoFit/>
+          </a:bodyPr>
+          <a:p>
+            <a:r>
+              <a:rPr lang="es-ES" altLang="en-US"/>
+              <a:t>Workshop Generar una libreria</a:t>
+            </a:r>
+            <a:endParaRPr lang="es-ES" altLang="en-US"/>
+          </a:p>
+        </p:txBody>
+      </p:sp>
+    </p:spTree>
+  </p:cSld>
+  <p:clrMapOvr>
+    <a:masterClrMapping/>
+  </p:clrMapOvr>
+</p:sld>
+</file>
+
 <file path=ppt/slides/slide2.xml><?xml version="1.0" encoding="utf-8"?>
 <p:sld xmlns:a="http://schemas.openxmlformats.org/drawingml/2006/main" xmlns:r="http://schemas.openxmlformats.org/officeDocument/2006/relationships" xmlns:p="http://schemas.openxmlformats.org/presentationml/2006/main" showMasterSp="0">
   <p:cSld>
@@ -6935,8 +8094,8 @@
         </p:nvSpPr>
         <p:spPr>
           <a:xfrm>
-            <a:off x="1487805" y="4197985"/>
-            <a:ext cx="7585075" cy="1938020"/>
+            <a:off x="4169410" y="4260850"/>
+            <a:ext cx="4065270" cy="1938020"/>
           </a:xfrm>
           <a:prstGeom prst="rect">
             <a:avLst/>
@@ -6988,17 +8147,19 @@
               <a:buAutoNum type="arabicPeriod"/>
             </a:pPr>
             <a:r>
-              <a:rPr lang="en-US">
+              <a:rPr lang="es-ES" altLang="en-US">
                 <a:solidFill>
                   <a:schemeClr val="bg1"/>
                 </a:solidFill>
+                <a:sym typeface="+mn-ea"/>
               </a:rPr>
-              <a:t>Documentacion automatizada de proyectos</a:t>
-            </a:r>
-            <a:endParaRPr lang="en-US">
+              <a:t>Automatic Documentation</a:t>
+            </a:r>
+            <a:endParaRPr lang="es-ES" altLang="en-US">
               <a:solidFill>
                 <a:schemeClr val="bg1"/>
               </a:solidFill>
+              <a:sym typeface="+mn-ea"/>
             </a:endParaRPr>
           </a:p>
           <a:p>
@@ -7047,7 +8208,7 @@
         </p:blipFill>
         <p:spPr>
           <a:xfrm>
-            <a:off x="2824480" y="1382395"/>
+            <a:off x="3524885" y="1383030"/>
             <a:ext cx="2529205" cy="2529205"/>
           </a:xfrm>
           <a:prstGeom prst="rect">
@@ -7071,14 +8232,92 @@
         </p:blipFill>
         <p:spPr>
           <a:xfrm>
-            <a:off x="7248525" y="1734820"/>
-            <a:ext cx="1823720" cy="1823720"/>
+            <a:off x="6402070" y="1663065"/>
+            <a:ext cx="1980565" cy="1980565"/>
           </a:xfrm>
           <a:prstGeom prst="rect">
             <a:avLst/>
           </a:prstGeom>
         </p:spPr>
       </p:pic>
+    </p:spTree>
+  </p:cSld>
+  <p:clrMapOvr>
+    <a:masterClrMapping/>
+  </p:clrMapOvr>
+</p:sld>
+</file>
+
+<file path=ppt/slides/slide20.xml><?xml version="1.0" encoding="utf-8"?>
+<p:sld xmlns:a="http://schemas.openxmlformats.org/drawingml/2006/main" xmlns:r="http://schemas.openxmlformats.org/officeDocument/2006/relationships" xmlns:p="http://schemas.openxmlformats.org/presentationml/2006/main">
+  <p:cSld>
+    <p:spTree>
+      <p:nvGrpSpPr>
+        <p:cNvPr id="1" name=""/>
+        <p:cNvGrpSpPr/>
+        <p:nvPr/>
+      </p:nvGrpSpPr>
+      <p:grpSpPr>
+        <a:xfrm>
+          <a:off x="0" y="0"/>
+          <a:ext cx="0" cy="0"/>
+          <a:chOff x="0" y="0"/>
+          <a:chExt cx="0" cy="0"/>
+        </a:xfrm>
+      </p:grpSpPr>
+      <p:sp>
+        <p:nvSpPr>
+          <p:cNvPr id="2" name="Título 1"/>
+          <p:cNvSpPr>
+            <a:spLocks noGrp="1"/>
+          </p:cNvSpPr>
+          <p:nvPr>
+            <p:ph type="title"/>
+          </p:nvPr>
+        </p:nvSpPr>
+        <p:spPr/>
+        <p:txBody>
+          <a:bodyPr>
+            <a:normAutofit fontScale="90000"/>
+          </a:bodyPr>
+          <a:lstStyle/>
+          <a:p>
+            <a:r>
+              <a:rPr lang="es-ES" dirty="0" err="1"/>
+              <a:t>XXXXXXXX</a:t>
+            </a:r>
+            <a:br>
+              <a:rPr lang="es-ES" dirty="0" err="1"/>
+            </a:br>
+            <a:endParaRPr lang="es-ES" dirty="0"/>
+          </a:p>
+        </p:txBody>
+      </p:sp>
+    </p:spTree>
+  </p:cSld>
+  <p:clrMapOvr>
+    <a:masterClrMapping/>
+  </p:clrMapOvr>
+</p:sld>
+</file>
+
+<file path=ppt/slides/slide21.xml><?xml version="1.0" encoding="utf-8"?>
+<p:sld xmlns:a="http://schemas.openxmlformats.org/drawingml/2006/main" xmlns:r="http://schemas.openxmlformats.org/officeDocument/2006/relationships" xmlns:p="http://schemas.openxmlformats.org/presentationml/2006/main">
+  <p:cSld>
+    <p:spTree>
+      <p:nvGrpSpPr>
+        <p:cNvPr id="1" name=""/>
+        <p:cNvGrpSpPr/>
+        <p:nvPr/>
+      </p:nvGrpSpPr>
+      <p:grpSpPr>
+        <a:xfrm>
+          <a:off x="0" y="0"/>
+          <a:ext cx="0" cy="0"/>
+          <a:chOff x="0" y="0"/>
+          <a:chExt cx="0" cy="0"/>
+        </a:xfrm>
+      </p:grpSpPr>
     </p:spTree>
   </p:cSld>
   <p:clrMapOvr>
@@ -7181,7 +8420,7 @@
                 </a:solidFill>
                 <a:sym typeface="+mn-ea"/>
               </a:rPr>
-              <a:t>Develop apps in modular fashion using core, shared and feature modules.</a:t>
+              <a:t>Develop apps in modular fashion using core, shared and feature modules</a:t>
             </a:r>
             <a:endParaRPr lang="es-ES" altLang="en-US">
               <a:solidFill>
@@ -7201,7 +8440,7 @@
                 </a:solidFill>
                 <a:sym typeface="+mn-ea"/>
               </a:rPr>
-              <a:t>Lazy loading a feature module. </a:t>
+              <a:t>Lazy loading a feature module </a:t>
             </a:r>
             <a:endParaRPr lang="es-ES" altLang="en-US">
               <a:solidFill>
@@ -7258,7 +8497,7 @@
             <a:r>
               <a:rPr lang="es-ES" altLang="en-US">
                 <a:solidFill>
-                  <a:srgbClr val="FFFF00"/>
+                  <a:schemeClr val="bg1"/>
                 </a:solidFill>
                 <a:sym typeface="+mn-ea"/>
               </a:rPr>
@@ -7364,7 +8603,7 @@
         </p:nvSpPr>
         <p:spPr>
           <a:xfrm>
-            <a:off x="1243330" y="4086225"/>
+            <a:off x="1319530" y="4117340"/>
             <a:ext cx="9552940" cy="858520"/>
           </a:xfrm>
         </p:spPr>
@@ -7458,7 +8697,7 @@
         </p:nvSpPr>
         <p:spPr>
           <a:xfrm>
-            <a:off x="583565" y="3068955"/>
+            <a:off x="413385" y="2091055"/>
             <a:ext cx="6114415" cy="1198880"/>
           </a:xfrm>
           <a:prstGeom prst="rect">
@@ -7561,7 +8800,7 @@
           <a:p>
             <a:r>
               <a:rPr lang="es-ES" altLang="en-US"/>
-              <a:t>angular.json</a:t>
+              <a:t>Commands</a:t>
             </a:r>
             <a:endParaRPr lang="es-ES" altLang="en-US"/>
           </a:p>
@@ -7569,7 +8808,7 @@
       </p:sp>
       <p:pic>
         <p:nvPicPr>
-          <p:cNvPr id="7" name="Imagen 6"/>
+          <p:cNvPr id="5" name="Imagen 4"/>
           <p:cNvPicPr>
             <a:picLocks noChangeAspect="1"/>
           </p:cNvPicPr>
@@ -7583,48 +8822,24 @@
         </p:blipFill>
         <p:spPr>
           <a:xfrm>
-            <a:off x="4464050" y="829310"/>
-            <a:ext cx="4534535" cy="3619500"/>
+            <a:off x="7008495" y="1737360"/>
+            <a:ext cx="2689860" cy="3383280"/>
           </a:xfrm>
           <a:prstGeom prst="rect">
             <a:avLst/>
           </a:prstGeom>
         </p:spPr>
       </p:pic>
-      <p:pic>
-        <p:nvPicPr>
-          <p:cNvPr id="8" name="Imagen 7"/>
-          <p:cNvPicPr>
-            <a:picLocks noChangeAspect="1"/>
-          </p:cNvPicPr>
-          <p:nvPr/>
-        </p:nvPicPr>
-        <p:blipFill>
-          <a:blip r:embed="rId2"/>
-          <a:stretch>
-            <a:fillRect/>
-          </a:stretch>
-        </p:blipFill>
-        <p:spPr>
-          <a:xfrm>
-            <a:off x="6807835" y="3548380"/>
-            <a:ext cx="4938395" cy="2743200"/>
-          </a:xfrm>
-          <a:prstGeom prst="rect">
-            <a:avLst/>
-          </a:prstGeom>
-        </p:spPr>
-      </p:pic>
-      <p:sp>
-        <p:nvSpPr>
-          <p:cNvPr id="9" name="Cuadro de texto 8"/>
+      <p:sp>
+        <p:nvSpPr>
+          <p:cNvPr id="6" name="Cuadro de texto 5"/>
           <p:cNvSpPr txBox="1"/>
           <p:nvPr/>
         </p:nvSpPr>
         <p:spPr>
           <a:xfrm>
-            <a:off x="299085" y="2020570"/>
-            <a:ext cx="4296410" cy="1938020"/>
+            <a:off x="5902325" y="5890260"/>
+            <a:ext cx="5717540" cy="460375"/>
           </a:xfrm>
           <a:prstGeom prst="rect">
             <a:avLst/>
@@ -7638,25 +8853,22 @@
           <a:p>
             <a:r>
               <a:rPr lang="es-ES" altLang="en-US"/>
-              <a:t>This file is used as the configuration schema for the whole project and manipulated by the CLI. </a:t>
+              <a:t>https://github.com/angular/angular-cli/wiki</a:t>
             </a:r>
             <a:endParaRPr lang="es-ES" altLang="en-US"/>
           </a:p>
-          <a:p>
-            <a:endParaRPr lang="es-ES" altLang="en-US"/>
-          </a:p>
-        </p:txBody>
-      </p:sp>
-      <p:sp>
-        <p:nvSpPr>
-          <p:cNvPr id="10" name="Cuadro de texto 9"/>
+        </p:txBody>
+      </p:sp>
+      <p:sp>
+        <p:nvSpPr>
+          <p:cNvPr id="7" name="Cuadro de texto 6"/>
           <p:cNvSpPr txBox="1"/>
           <p:nvPr/>
         </p:nvSpPr>
         <p:spPr>
           <a:xfrm>
-            <a:off x="299085" y="4721225"/>
-            <a:ext cx="6508115" cy="1568450"/>
+            <a:off x="274320" y="1665605"/>
+            <a:ext cx="5966460" cy="1568450"/>
           </a:xfrm>
           <a:prstGeom prst="rect">
             <a:avLst/>
@@ -7669,10 +8881,18 @@
           </a:bodyPr>
           <a:p>
             <a:r>
-              <a:rPr lang="es-ES" altLang="en-US">
-                <a:sym typeface="+mn-ea"/>
-              </a:rPr>
-              <a:t>Including managing of different environments, testing, proxy, third-party resources and plenty of built-in tools and capabilities for developing our application.</a:t>
+              <a:rPr lang="es-ES" altLang="en-US"/>
+              <a:t>Command syntax is shown as follows:</a:t>
+            </a:r>
+            <a:endParaRPr lang="es-ES" altLang="en-US"/>
+          </a:p>
+          <a:p>
+            <a:endParaRPr lang="es-ES" altLang="en-US"/>
+          </a:p>
+          <a:p>
+            <a:r>
+              <a:rPr lang="es-ES" altLang="en-US"/>
+              <a:t>ng commandNameOrAlias requiredArg [optionalArg] [options]</a:t>
             </a:r>
             <a:endParaRPr lang="es-ES" altLang="en-US"/>
           </a:p>
@@ -7714,7 +8934,7 @@
               <a:rPr lang="es-ES" altLang="en-US">
                 <a:sym typeface="+mn-ea"/>
               </a:rPr>
-              <a:t>Angular CLI</a:t>
+              <a:t>Commands</a:t>
             </a:r>
             <a:br>
               <a:rPr lang="es-ES" altLang="en-US"/>
@@ -7738,10 +8958,66 @@
           <a:bodyPr/>
           <a:p>
             <a:r>
-              <a:rPr lang="es-ES" altLang="en-US">
-                <a:sym typeface="+mn-ea"/>
-              </a:rPr>
-              <a:t>angular.json</a:t>
+              <a:rPr lang="es-ES" altLang="en-US"/>
+              <a:t>ng-new</a:t>
+            </a:r>
+            <a:endParaRPr lang="es-ES" altLang="en-US"/>
+          </a:p>
+        </p:txBody>
+      </p:sp>
+      <p:sp>
+        <p:nvSpPr>
+          <p:cNvPr id="4" name="Cuadro de texto 3"/>
+          <p:cNvSpPr txBox="1"/>
+          <p:nvPr/>
+        </p:nvSpPr>
+        <p:spPr>
+          <a:xfrm>
+            <a:off x="299085" y="1732280"/>
+            <a:ext cx="5151755" cy="829945"/>
+          </a:xfrm>
+          <a:prstGeom prst="rect">
+            <a:avLst/>
+          </a:prstGeom>
+          <a:noFill/>
+        </p:spPr>
+        <p:txBody>
+          <a:bodyPr wrap="square" rtlCol="0" anchor="t">
+            <a:spAutoFit/>
+          </a:bodyPr>
+          <a:p>
+            <a:r>
+              <a:rPr lang="es-ES" altLang="en-US"/>
+              <a:t>Creates a new workspace and an initial Angular app.</a:t>
+            </a:r>
+            <a:endParaRPr lang="es-ES" altLang="en-US"/>
+          </a:p>
+        </p:txBody>
+      </p:sp>
+      <p:sp>
+        <p:nvSpPr>
+          <p:cNvPr id="6" name="Cuadro de texto 5"/>
+          <p:cNvSpPr txBox="1"/>
+          <p:nvPr/>
+        </p:nvSpPr>
+        <p:spPr>
+          <a:xfrm>
+            <a:off x="299085" y="2693670"/>
+            <a:ext cx="4979670" cy="460375"/>
+          </a:xfrm>
+          <a:prstGeom prst="rect">
+            <a:avLst/>
+          </a:prstGeom>
+          <a:noFill/>
+        </p:spPr>
+        <p:txBody>
+          <a:bodyPr wrap="square" rtlCol="0" anchor="t">
+            <a:spAutoFit/>
+          </a:bodyPr>
+          <a:p>
+            <a:r>
+              <a:rPr lang="es-ES" altLang="en-US"/>
+              <a:t>ng new &lt;name&gt; [options]</a:t>
             </a:r>
             <a:endParaRPr lang="es-ES" altLang="en-US"/>
           </a:p>
@@ -7749,7 +9025,7 @@
       </p:sp>
       <p:pic>
         <p:nvPicPr>
-          <p:cNvPr id="4" name="Imagen 3" descr="angular-cli-workspace-example"/>
+          <p:cNvPr id="7" name="Imagen 6"/>
           <p:cNvPicPr>
             <a:picLocks noChangeAspect="1"/>
           </p:cNvPicPr>
@@ -7763,14 +9039,79 @@
         </p:blipFill>
         <p:spPr>
           <a:xfrm>
-            <a:off x="4450080" y="3373755"/>
-            <a:ext cx="3291840" cy="701040"/>
+            <a:off x="5016500" y="3966210"/>
+            <a:ext cx="7012305" cy="1986915"/>
           </a:xfrm>
           <a:prstGeom prst="rect">
             <a:avLst/>
           </a:prstGeom>
         </p:spPr>
       </p:pic>
+      <p:pic>
+        <p:nvPicPr>
+          <p:cNvPr id="9" name="Imagen 8"/>
+          <p:cNvPicPr>
+            <a:picLocks noChangeAspect="1"/>
+          </p:cNvPicPr>
+          <p:nvPr/>
+        </p:nvPicPr>
+        <p:blipFill>
+          <a:blip r:embed="rId2"/>
+          <a:stretch>
+            <a:fillRect/>
+          </a:stretch>
+        </p:blipFill>
+        <p:spPr>
+          <a:xfrm>
+            <a:off x="5511800" y="1637665"/>
+            <a:ext cx="5850255" cy="2072640"/>
+          </a:xfrm>
+          <a:prstGeom prst="rect">
+            <a:avLst/>
+          </a:prstGeom>
+        </p:spPr>
+      </p:pic>
+      <p:sp>
+        <p:nvSpPr>
+          <p:cNvPr id="10" name="Cuadro de texto 9"/>
+          <p:cNvSpPr txBox="1"/>
+          <p:nvPr/>
+        </p:nvSpPr>
+        <p:spPr>
+          <a:xfrm>
+            <a:off x="265430" y="3966210"/>
+            <a:ext cx="4124960" cy="829945"/>
+          </a:xfrm>
+          <a:prstGeom prst="rect">
+            <a:avLst/>
+          </a:prstGeom>
+          <a:noFill/>
+        </p:spPr>
+        <p:txBody>
+          <a:bodyPr wrap="square" rtlCol="0">
+            <a:spAutoFit/>
+          </a:bodyPr>
+          <a:p>
+            <a:r>
+              <a:rPr lang="es-ES" altLang="en-US">
+                <a:solidFill>
+                  <a:schemeClr val="bg1">
+                    <a:lumMod val="65000"/>
+                  </a:schemeClr>
+                </a:solidFill>
+              </a:rPr>
+              <a:t>default interactive = true -&gt; Angular 7</a:t>
+            </a:r>
+            <a:endParaRPr lang="es-ES" altLang="en-US">
+              <a:solidFill>
+                <a:schemeClr val="bg1">
+                  <a:lumMod val="65000"/>
+                </a:schemeClr>
+              </a:solidFill>
+            </a:endParaRPr>
+          </a:p>
+        </p:txBody>
+      </p:sp>
     </p:spTree>
   </p:cSld>
   <p:clrMapOvr>
@@ -7788,14 +9129,7 @@
         <p:cNvGrpSpPr/>
         <p:nvPr/>
       </p:nvGrpSpPr>
-      <p:grpSpPr>
-        <a:xfrm>
-          <a:off x="0" y="0"/>
-          <a:ext cx="0" cy="0"/>
-          <a:chOff x="0" y="0"/>
-          <a:chExt cx="0" cy="0"/>
-        </a:xfrm>
-      </p:grpSpPr>
+      <p:grpSpPr/>
       <p:sp>
         <p:nvSpPr>
           <p:cNvPr id="2" name="Título 1"/>
@@ -7808,22 +9142,245 @@
         </p:nvSpPr>
         <p:spPr/>
         <p:txBody>
-          <a:bodyPr>
-            <a:normAutofit fontScale="90000"/>
+          <a:bodyPr/>
+          <a:p>
+            <a:r>
+              <a:rPr lang="es-ES" altLang="en-US">
+                <a:sym typeface="+mn-ea"/>
+              </a:rPr>
+              <a:t>Commands</a:t>
+            </a:r>
+            <a:br>
+              <a:rPr lang="es-ES" altLang="en-US"/>
+            </a:br>
+            <a:endParaRPr lang="es-ES" altLang="en-US"/>
+          </a:p>
+        </p:txBody>
+      </p:sp>
+      <p:sp>
+        <p:nvSpPr>
+          <p:cNvPr id="3" name="Marcador de posición de texto 2"/>
+          <p:cNvSpPr>
+            <a:spLocks noGrp="1"/>
+          </p:cNvSpPr>
+          <p:nvPr>
+            <p:ph type="body" sz="quarter" idx="13"/>
+          </p:nvPr>
+        </p:nvSpPr>
+        <p:spPr/>
+        <p:txBody>
+          <a:bodyPr/>
+          <a:p>
+            <a:r>
+              <a:rPr lang="es-ES" altLang="en-US"/>
+              <a:t>ng-generate</a:t>
+            </a:r>
+            <a:endParaRPr lang="es-ES" altLang="en-US"/>
+          </a:p>
+        </p:txBody>
+      </p:sp>
+      <p:pic>
+        <p:nvPicPr>
+          <p:cNvPr id="4" name="Imagen 3"/>
+          <p:cNvPicPr>
+            <a:picLocks noChangeAspect="1"/>
+          </p:cNvPicPr>
+          <p:nvPr/>
+        </p:nvPicPr>
+        <p:blipFill>
+          <a:blip r:embed="rId1"/>
+          <a:stretch>
+            <a:fillRect/>
+          </a:stretch>
+        </p:blipFill>
+        <p:spPr>
+          <a:xfrm>
+            <a:off x="9848850" y="1514475"/>
+            <a:ext cx="1871980" cy="4125595"/>
+          </a:xfrm>
+          <a:prstGeom prst="rect">
+            <a:avLst/>
+          </a:prstGeom>
+        </p:spPr>
+      </p:pic>
+      <p:sp>
+        <p:nvSpPr>
+          <p:cNvPr id="5" name="Cuadro de texto 4"/>
+          <p:cNvSpPr txBox="1"/>
+          <p:nvPr/>
+        </p:nvSpPr>
+        <p:spPr>
+          <a:xfrm>
+            <a:off x="332105" y="2989580"/>
+            <a:ext cx="4584065" cy="460375"/>
+          </a:xfrm>
+          <a:prstGeom prst="rect">
+            <a:avLst/>
+          </a:prstGeom>
+          <a:noFill/>
+        </p:spPr>
+        <p:txBody>
+          <a:bodyPr wrap="square" rtlCol="0" anchor="t">
+            <a:spAutoFit/>
           </a:bodyPr>
-          <a:lstStyle/>
-          <a:p>
-            <a:r>
-              <a:rPr lang="es-ES" dirty="0" err="1"/>
-              <a:t>XXXXXXXX</a:t>
-            </a:r>
-            <a:br>
-              <a:rPr lang="es-ES" dirty="0" err="1"/>
-            </a:br>
-            <a:endParaRPr lang="es-ES" dirty="0"/>
-          </a:p>
-        </p:txBody>
-      </p:sp>
+          <a:p>
+            <a:r>
+              <a:rPr lang="es-ES" altLang="en-US"/>
+              <a:t>ng generate &lt;schematic&gt; [options]</a:t>
+            </a:r>
+            <a:endParaRPr lang="es-ES" altLang="en-US"/>
+          </a:p>
+        </p:txBody>
+      </p:sp>
+      <p:sp>
+        <p:nvSpPr>
+          <p:cNvPr id="6" name="Cuadro de texto 5"/>
+          <p:cNvSpPr txBox="1"/>
+          <p:nvPr/>
+        </p:nvSpPr>
+        <p:spPr>
+          <a:xfrm>
+            <a:off x="304165" y="1945005"/>
+            <a:ext cx="5050155" cy="829945"/>
+          </a:xfrm>
+          <a:prstGeom prst="rect">
+            <a:avLst/>
+          </a:prstGeom>
+          <a:noFill/>
+        </p:spPr>
+        <p:txBody>
+          <a:bodyPr wrap="square" rtlCol="0" anchor="t">
+            <a:spAutoFit/>
+          </a:bodyPr>
+          <a:p>
+            <a:r>
+              <a:rPr lang="es-ES" altLang="en-US"/>
+              <a:t>Generates and/or modifies files based on a schematic.</a:t>
+            </a:r>
+            <a:endParaRPr lang="es-ES" altLang="en-US"/>
+          </a:p>
+        </p:txBody>
+      </p:sp>
+      <p:pic>
+        <p:nvPicPr>
+          <p:cNvPr id="7" name="Imagen 6"/>
+          <p:cNvPicPr>
+            <a:picLocks noChangeAspect="1"/>
+          </p:cNvPicPr>
+          <p:nvPr/>
+        </p:nvPicPr>
+        <p:blipFill>
+          <a:blip r:embed="rId2"/>
+          <a:stretch>
+            <a:fillRect/>
+          </a:stretch>
+        </p:blipFill>
+        <p:spPr>
+          <a:xfrm>
+            <a:off x="5984875" y="1514475"/>
+            <a:ext cx="3726815" cy="784860"/>
+          </a:xfrm>
+          <a:prstGeom prst="rect">
+            <a:avLst/>
+          </a:prstGeom>
+        </p:spPr>
+      </p:pic>
+      <p:pic>
+        <p:nvPicPr>
+          <p:cNvPr id="9" name="Imagen 8"/>
+          <p:cNvPicPr>
+            <a:picLocks noChangeAspect="1"/>
+          </p:cNvPicPr>
+          <p:nvPr/>
+        </p:nvPicPr>
+        <p:blipFill>
+          <a:blip r:embed="rId3"/>
+          <a:stretch>
+            <a:fillRect/>
+          </a:stretch>
+        </p:blipFill>
+        <p:spPr>
+          <a:xfrm>
+            <a:off x="5984875" y="2579370"/>
+            <a:ext cx="3611880" cy="838200"/>
+          </a:xfrm>
+          <a:prstGeom prst="rect">
+            <a:avLst/>
+          </a:prstGeom>
+        </p:spPr>
+      </p:pic>
+      <p:pic>
+        <p:nvPicPr>
+          <p:cNvPr id="10" name="Imagen 9"/>
+          <p:cNvPicPr>
+            <a:picLocks noChangeAspect="1"/>
+          </p:cNvPicPr>
+          <p:nvPr/>
+        </p:nvPicPr>
+        <p:blipFill>
+          <a:blip r:embed="rId4"/>
+          <a:stretch>
+            <a:fillRect/>
+          </a:stretch>
+        </p:blipFill>
+        <p:spPr>
+          <a:xfrm>
+            <a:off x="5984875" y="3850005"/>
+            <a:ext cx="3634740" cy="982980"/>
+          </a:xfrm>
+          <a:prstGeom prst="rect">
+            <a:avLst/>
+          </a:prstGeom>
+        </p:spPr>
+      </p:pic>
+      <p:pic>
+        <p:nvPicPr>
+          <p:cNvPr id="11" name="Imagen 10"/>
+          <p:cNvPicPr>
+            <a:picLocks noChangeAspect="1"/>
+          </p:cNvPicPr>
+          <p:nvPr/>
+        </p:nvPicPr>
+        <p:blipFill>
+          <a:blip r:embed="rId5"/>
+          <a:stretch>
+            <a:fillRect/>
+          </a:stretch>
+        </p:blipFill>
+        <p:spPr>
+          <a:xfrm>
+            <a:off x="5984875" y="5147310"/>
+            <a:ext cx="3429000" cy="815340"/>
+          </a:xfrm>
+          <a:prstGeom prst="rect">
+            <a:avLst/>
+          </a:prstGeom>
+        </p:spPr>
+      </p:pic>
+      <p:pic>
+        <p:nvPicPr>
+          <p:cNvPr id="12" name="Imagen 11"/>
+          <p:cNvPicPr>
+            <a:picLocks noChangeAspect="1"/>
+          </p:cNvPicPr>
+          <p:nvPr/>
+        </p:nvPicPr>
+        <p:blipFill>
+          <a:blip r:embed="rId6"/>
+          <a:stretch>
+            <a:fillRect/>
+          </a:stretch>
+        </p:blipFill>
+        <p:spPr>
+          <a:xfrm>
+            <a:off x="393700" y="3850005"/>
+            <a:ext cx="5323205" cy="777240"/>
+          </a:xfrm>
+          <a:prstGeom prst="rect">
+            <a:avLst/>
+          </a:prstGeom>
+        </p:spPr>
+      </p:pic>
     </p:spTree>
   </p:cSld>
   <p:clrMapOvr>
@@ -7841,14 +9398,162 @@
         <p:cNvGrpSpPr/>
         <p:nvPr/>
       </p:nvGrpSpPr>
-      <p:grpSpPr>
-        <a:xfrm>
-          <a:off x="0" y="0"/>
-          <a:ext cx="0" cy="0"/>
-          <a:chOff x="0" y="0"/>
-          <a:chExt cx="0" cy="0"/>
-        </a:xfrm>
-      </p:grpSpPr>
+      <p:grpSpPr/>
+      <p:sp>
+        <p:nvSpPr>
+          <p:cNvPr id="2" name="Título 1"/>
+          <p:cNvSpPr>
+            <a:spLocks noGrp="1"/>
+          </p:cNvSpPr>
+          <p:nvPr>
+            <p:ph type="title"/>
+          </p:nvPr>
+        </p:nvSpPr>
+        <p:spPr/>
+        <p:txBody>
+          <a:bodyPr/>
+          <a:p>
+            <a:r>
+              <a:rPr lang="es-ES" altLang="en-US">
+                <a:sym typeface="+mn-ea"/>
+              </a:rPr>
+              <a:t>Commands</a:t>
+            </a:r>
+            <a:br>
+              <a:rPr lang="es-ES" altLang="en-US"/>
+            </a:br>
+            <a:endParaRPr lang="es-ES" altLang="en-US"/>
+          </a:p>
+        </p:txBody>
+      </p:sp>
+      <p:sp>
+        <p:nvSpPr>
+          <p:cNvPr id="3" name="Marcador de posición de texto 2"/>
+          <p:cNvSpPr>
+            <a:spLocks noGrp="1"/>
+          </p:cNvSpPr>
+          <p:nvPr>
+            <p:ph type="body" sz="quarter" idx="13"/>
+          </p:nvPr>
+        </p:nvSpPr>
+        <p:spPr/>
+        <p:txBody>
+          <a:bodyPr/>
+          <a:p>
+            <a:r>
+              <a:rPr lang="es-ES" altLang="en-US"/>
+              <a:t>ng-update</a:t>
+            </a:r>
+            <a:endParaRPr lang="es-ES" altLang="en-US"/>
+          </a:p>
+        </p:txBody>
+      </p:sp>
+      <p:sp>
+        <p:nvSpPr>
+          <p:cNvPr id="4" name="Cuadro de texto 3"/>
+          <p:cNvSpPr txBox="1"/>
+          <p:nvPr/>
+        </p:nvSpPr>
+        <p:spPr>
+          <a:xfrm>
+            <a:off x="403860" y="1664335"/>
+            <a:ext cx="4466590" cy="829945"/>
+          </a:xfrm>
+          <a:prstGeom prst="rect">
+            <a:avLst/>
+          </a:prstGeom>
+          <a:noFill/>
+        </p:spPr>
+        <p:txBody>
+          <a:bodyPr wrap="square" rtlCol="0" anchor="t">
+            <a:spAutoFit/>
+          </a:bodyPr>
+          <a:p>
+            <a:r>
+              <a:rPr lang="es-ES" altLang="en-US"/>
+              <a:t>Updates your application and its dependencies</a:t>
+            </a:r>
+            <a:endParaRPr lang="es-ES" altLang="en-US"/>
+          </a:p>
+        </p:txBody>
+      </p:sp>
+      <p:sp>
+        <p:nvSpPr>
+          <p:cNvPr id="5" name="Cuadro de texto 4"/>
+          <p:cNvSpPr txBox="1"/>
+          <p:nvPr/>
+        </p:nvSpPr>
+        <p:spPr>
+          <a:xfrm>
+            <a:off x="416560" y="2515235"/>
+            <a:ext cx="2540000" cy="460375"/>
+          </a:xfrm>
+          <a:prstGeom prst="rect">
+            <a:avLst/>
+          </a:prstGeom>
+          <a:noFill/>
+        </p:spPr>
+        <p:txBody>
+          <a:bodyPr wrap="square" rtlCol="0" anchor="t">
+            <a:spAutoFit/>
+          </a:bodyPr>
+          <a:p>
+            <a:r>
+              <a:rPr lang="es-ES" altLang="en-US"/>
+              <a:t>ng update [options]</a:t>
+            </a:r>
+            <a:endParaRPr lang="es-ES" altLang="en-US"/>
+          </a:p>
+        </p:txBody>
+      </p:sp>
+      <p:pic>
+        <p:nvPicPr>
+          <p:cNvPr id="6" name="Imagen 5"/>
+          <p:cNvPicPr>
+            <a:picLocks noChangeAspect="1"/>
+          </p:cNvPicPr>
+          <p:nvPr/>
+        </p:nvPicPr>
+        <p:blipFill>
+          <a:blip r:embed="rId1"/>
+          <a:stretch>
+            <a:fillRect/>
+          </a:stretch>
+        </p:blipFill>
+        <p:spPr>
+          <a:xfrm>
+            <a:off x="5137785" y="1573530"/>
+            <a:ext cx="6508115" cy="1896110"/>
+          </a:xfrm>
+          <a:prstGeom prst="rect">
+            <a:avLst/>
+          </a:prstGeom>
+        </p:spPr>
+      </p:pic>
+      <p:pic>
+        <p:nvPicPr>
+          <p:cNvPr id="7" name="Imagen 6"/>
+          <p:cNvPicPr>
+            <a:picLocks noChangeAspect="1"/>
+          </p:cNvPicPr>
+          <p:nvPr/>
+        </p:nvPicPr>
+        <p:blipFill>
+          <a:blip r:embed="rId2"/>
+          <a:stretch>
+            <a:fillRect/>
+          </a:stretch>
+        </p:blipFill>
+        <p:spPr>
+          <a:xfrm>
+            <a:off x="5137785" y="3711575"/>
+            <a:ext cx="5654675" cy="1127760"/>
+          </a:xfrm>
+          <a:prstGeom prst="rect">
+            <a:avLst/>
+          </a:prstGeom>
+        </p:spPr>
+      </p:pic>
     </p:spTree>
   </p:cSld>
   <p:clrMapOvr>

</xml_diff>

<commit_message>
Presentaciones, y taller para apartado cuatro
</commit_message>
<xml_diff>
--- a/02_angular_cli/02_angular_cli.pptx
+++ b/02_angular_cli/02_angular_cli.pptx
@@ -10,7 +10,7 @@
     <p:notesMasterId r:id="rId16"/>
   </p:notesMasterIdLst>
   <p:sldIdLst>
-    <p:sldId id="314" r:id="rId5"/>
+    <p:sldId id="548" r:id="rId5"/>
     <p:sldId id="485" r:id="rId6"/>
     <p:sldId id="515" r:id="rId7"/>
     <p:sldId id="484" r:id="rId8"/>
@@ -6582,7 +6582,7 @@
         </p:nvSpPr>
         <p:spPr>
           <a:xfrm>
-            <a:off x="7582535" y="4660900"/>
+            <a:off x="4011930" y="4591050"/>
             <a:ext cx="4169410" cy="441960"/>
           </a:xfrm>
           <a:prstGeom prst="rect">
@@ -6752,139 +6752,6 @@
           </a:p>
         </p:txBody>
       </p:sp>
-      <p:sp>
-        <p:nvSpPr>
-          <p:cNvPr id="6" name="2 Marcador de pie de página"/>
-          <p:cNvSpPr txBox="1"/>
-          <p:nvPr/>
-        </p:nvSpPr>
-        <p:spPr>
-          <a:xfrm>
-            <a:off x="4167386" y="4001374"/>
-            <a:ext cx="3857228" cy="363730"/>
-          </a:xfrm>
-          <a:prstGeom prst="rect">
-            <a:avLst/>
-          </a:prstGeom>
-        </p:spPr>
-        <p:txBody>
-          <a:bodyPr vert="horz" lIns="91440" tIns="45720" rIns="91440" bIns="45720" rtlCol="0" anchor="ctr"/>
-          <a:lstStyle>
-            <a:defPPr>
-              <a:defRPr lang="fr-FR"/>
-            </a:defPPr>
-            <a:lvl1pPr marL="0" algn="ctr" defTabSz="1218565" rtl="0" eaLnBrk="1" latinLnBrk="0" hangingPunct="1">
-              <a:defRPr sz="1600" kern="1200">
-                <a:solidFill>
-                  <a:schemeClr val="tx1">
-                    <a:tint val="75000"/>
-                  </a:schemeClr>
-                </a:solidFill>
-                <a:latin typeface="+mn-lt"/>
-                <a:ea typeface="+mn-ea"/>
-                <a:cs typeface="+mn-cs"/>
-              </a:defRPr>
-            </a:lvl1pPr>
-            <a:lvl2pPr marL="609600" algn="l" defTabSz="1218565" rtl="0" eaLnBrk="1" latinLnBrk="0" hangingPunct="1">
-              <a:defRPr sz="2400" kern="1200">
-                <a:solidFill>
-                  <a:schemeClr val="tx1"/>
-                </a:solidFill>
-                <a:latin typeface="+mn-lt"/>
-                <a:ea typeface="+mn-ea"/>
-                <a:cs typeface="+mn-cs"/>
-              </a:defRPr>
-            </a:lvl2pPr>
-            <a:lvl3pPr marL="1218565" algn="l" defTabSz="1218565" rtl="0" eaLnBrk="1" latinLnBrk="0" hangingPunct="1">
-              <a:defRPr sz="2400" kern="1200">
-                <a:solidFill>
-                  <a:schemeClr val="tx1"/>
-                </a:solidFill>
-                <a:latin typeface="+mn-lt"/>
-                <a:ea typeface="+mn-ea"/>
-                <a:cs typeface="+mn-cs"/>
-              </a:defRPr>
-            </a:lvl3pPr>
-            <a:lvl4pPr marL="1828165" algn="l" defTabSz="1218565" rtl="0" eaLnBrk="1" latinLnBrk="0" hangingPunct="1">
-              <a:defRPr sz="2400" kern="1200">
-                <a:solidFill>
-                  <a:schemeClr val="tx1"/>
-                </a:solidFill>
-                <a:latin typeface="+mn-lt"/>
-                <a:ea typeface="+mn-ea"/>
-                <a:cs typeface="+mn-cs"/>
-              </a:defRPr>
-            </a:lvl4pPr>
-            <a:lvl5pPr marL="2437130" algn="l" defTabSz="1218565" rtl="0" eaLnBrk="1" latinLnBrk="0" hangingPunct="1">
-              <a:defRPr sz="2400" kern="1200">
-                <a:solidFill>
-                  <a:schemeClr val="tx1"/>
-                </a:solidFill>
-                <a:latin typeface="+mn-lt"/>
-                <a:ea typeface="+mn-ea"/>
-                <a:cs typeface="+mn-cs"/>
-              </a:defRPr>
-            </a:lvl5pPr>
-            <a:lvl6pPr marL="3046730" algn="l" defTabSz="1218565" rtl="0" eaLnBrk="1" latinLnBrk="0" hangingPunct="1">
-              <a:defRPr sz="2400" kern="1200">
-                <a:solidFill>
-                  <a:schemeClr val="tx1"/>
-                </a:solidFill>
-                <a:latin typeface="+mn-lt"/>
-                <a:ea typeface="+mn-ea"/>
-                <a:cs typeface="+mn-cs"/>
-              </a:defRPr>
-            </a:lvl6pPr>
-            <a:lvl7pPr marL="3656330" algn="l" defTabSz="1218565" rtl="0" eaLnBrk="1" latinLnBrk="0" hangingPunct="1">
-              <a:defRPr sz="2400" kern="1200">
-                <a:solidFill>
-                  <a:schemeClr val="tx1"/>
-                </a:solidFill>
-                <a:latin typeface="+mn-lt"/>
-                <a:ea typeface="+mn-ea"/>
-                <a:cs typeface="+mn-cs"/>
-              </a:defRPr>
-            </a:lvl7pPr>
-            <a:lvl8pPr marL="4265295" algn="l" defTabSz="1218565" rtl="0" eaLnBrk="1" latinLnBrk="0" hangingPunct="1">
-              <a:defRPr sz="2400" kern="1200">
-                <a:solidFill>
-                  <a:schemeClr val="tx1"/>
-                </a:solidFill>
-                <a:latin typeface="+mn-lt"/>
-                <a:ea typeface="+mn-ea"/>
-                <a:cs typeface="+mn-cs"/>
-              </a:defRPr>
-            </a:lvl8pPr>
-            <a:lvl9pPr marL="4874895" algn="l" defTabSz="1218565" rtl="0" eaLnBrk="1" latinLnBrk="0" hangingPunct="1">
-              <a:defRPr sz="2400" kern="1200">
-                <a:solidFill>
-                  <a:schemeClr val="tx1"/>
-                </a:solidFill>
-                <a:latin typeface="+mn-lt"/>
-                <a:ea typeface="+mn-ea"/>
-                <a:cs typeface="+mn-cs"/>
-              </a:defRPr>
-            </a:lvl9pPr>
-          </a:lstStyle>
-          <a:p>
-            <a:pPr>
-              <a:lnSpc>
-                <a:spcPct val="150000"/>
-              </a:lnSpc>
-            </a:pPr>
-            <a:endParaRPr lang="es-ES" sz="1865" b="1" dirty="0">
-              <a:solidFill>
-                <a:schemeClr val="accent1">
-                  <a:lumMod val="20000"/>
-                  <a:lumOff val="80000"/>
-                </a:schemeClr>
-              </a:solidFill>
-              <a:latin typeface="Roboto Light" panose="02000000000000000000" pitchFamily="2" charset="0"/>
-              <a:ea typeface="Roboto Light" panose="02000000000000000000" pitchFamily="2" charset="0"/>
-            </a:endParaRPr>
-          </a:p>
-        </p:txBody>
-      </p:sp>
     </p:spTree>
   </p:cSld>
   <p:clrMapOvr>
@@ -8171,8 +8038,9 @@
                 <a:solidFill>
                   <a:schemeClr val="bg1"/>
                 </a:solidFill>
+                <a:sym typeface="+mn-ea"/>
               </a:rPr>
-              <a:t>Flow Events</a:t>
+              <a:t>Reactive Programming</a:t>
             </a:r>
             <a:endParaRPr lang="en-US">
               <a:solidFill>

</xml_diff>